<commit_message>
tradotte le mie slide
</commit_message>
<xml_diff>
--- a/Siamese Networks and Image Verification, parts 2 and 3.pptx
+++ b/Siamese Networks and Image Verification, parts 2 and 3.pptx
@@ -1772,7 +1772,7 @@
             <a:fld id="{FEBF2029-114C-0D43-8C35-19F9021EEC9A}" type="datetime1">
               <a:rPr lang="it-IT" altLang="it-IT"/>
               <a:pPr/>
-              <a:t>12/06/2019</a:t>
+              <a:t>22/06/2019</a:t>
             </a:fld>
             <a:endParaRPr lang="it-IT" altLang="it-IT"/>
           </a:p>
@@ -1964,7 +1964,7 @@
             <a:fld id="{2FCC8F5B-DF4F-2344-8691-F6C6B3286064}" type="datetime1">
               <a:rPr lang="it-IT" altLang="it-IT"/>
               <a:pPr/>
-              <a:t>12/06/2019</a:t>
+              <a:t>22/06/2019</a:t>
             </a:fld>
             <a:endParaRPr lang="it-IT" altLang="it-IT"/>
           </a:p>
@@ -2166,7 +2166,7 @@
             <a:fld id="{2435388F-952C-F140-A1D8-E49780A02D7E}" type="datetime1">
               <a:rPr lang="it-IT" altLang="it-IT"/>
               <a:pPr/>
-              <a:t>12/06/2019</a:t>
+              <a:t>22/06/2019</a:t>
             </a:fld>
             <a:endParaRPr lang="it-IT" altLang="it-IT"/>
           </a:p>
@@ -2407,7 +2407,7 @@
             <a:fld id="{C9CD4B5B-BA4F-DA46-AF47-8282D6C4A48D}" type="datetime1">
               <a:rPr lang="it-IT" altLang="it-IT"/>
               <a:pPr/>
-              <a:t>12/06/2019</a:t>
+              <a:t>22/06/2019</a:t>
             </a:fld>
             <a:endParaRPr lang="it-IT" altLang="it-IT"/>
           </a:p>
@@ -2624,7 +2624,7 @@
             <a:fld id="{CBD5AA7D-B959-2747-9666-16F3E8DED4A1}" type="datetime1">
               <a:rPr lang="it-IT" altLang="it-IT"/>
               <a:pPr/>
-              <a:t>12/06/2019</a:t>
+              <a:t>22/06/2019</a:t>
             </a:fld>
             <a:endParaRPr lang="it-IT" altLang="it-IT"/>
           </a:p>
@@ -2841,7 +2841,7 @@
             <a:fld id="{8B7C6A53-70DA-FC40-91A5-C457840C5E61}" type="datetime1">
               <a:rPr lang="it-IT" altLang="it-IT"/>
               <a:pPr/>
-              <a:t>12/06/2019</a:t>
+              <a:t>22/06/2019</a:t>
             </a:fld>
             <a:endParaRPr lang="it-IT" altLang="it-IT"/>
           </a:p>
@@ -3043,7 +3043,7 @@
             <a:fld id="{5FE27D20-0B32-5D45-9A0B-0C7CC0271879}" type="datetime1">
               <a:rPr lang="it-IT" altLang="it-IT"/>
               <a:pPr/>
-              <a:t>12/06/2019</a:t>
+              <a:t>22/06/2019</a:t>
             </a:fld>
             <a:endParaRPr lang="it-IT" altLang="it-IT"/>
           </a:p>
@@ -3286,7 +3286,7 @@
             <a:fld id="{11920B5F-69EE-AC48-9DF3-98215AFAB723}" type="datetime1">
               <a:rPr lang="it-IT" altLang="it-IT"/>
               <a:pPr/>
-              <a:t>12/06/2019</a:t>
+              <a:t>22/06/2019</a:t>
             </a:fld>
             <a:endParaRPr lang="it-IT" altLang="it-IT"/>
           </a:p>
@@ -3517,7 +3517,7 @@
             <a:fld id="{FB8C070B-B5FF-3D45-AAB5-DF9925D634F2}" type="datetime1">
               <a:rPr lang="it-IT" altLang="it-IT"/>
               <a:pPr/>
-              <a:t>12/06/2019</a:t>
+              <a:t>22/06/2019</a:t>
             </a:fld>
             <a:endParaRPr lang="it-IT" altLang="it-IT"/>
           </a:p>
@@ -3895,7 +3895,7 @@
             <a:fld id="{A9805388-1E69-C94F-9601-9CB9579F1E2D}" type="datetime1">
               <a:rPr lang="it-IT" altLang="it-IT"/>
               <a:pPr/>
-              <a:t>12/06/2019</a:t>
+              <a:t>22/06/2019</a:t>
             </a:fld>
             <a:endParaRPr lang="it-IT" altLang="it-IT"/>
           </a:p>
@@ -4058,7 +4058,7 @@
             <a:fld id="{E56399B9-51A3-6341-8637-B4361467B9D4}" type="datetime1">
               <a:rPr lang="it-IT" altLang="it-IT"/>
               <a:pPr/>
-              <a:t>12/06/2019</a:t>
+              <a:t>22/06/2019</a:t>
             </a:fld>
             <a:endParaRPr lang="it-IT" altLang="it-IT"/>
           </a:p>
@@ -4192,7 +4192,7 @@
             <a:fld id="{47E61D4D-DCE6-634F-B82F-5301E4C98B21}" type="datetime1">
               <a:rPr lang="it-IT" altLang="it-IT"/>
               <a:pPr/>
-              <a:t>12/06/2019</a:t>
+              <a:t>22/06/2019</a:t>
             </a:fld>
             <a:endParaRPr lang="it-IT" altLang="it-IT"/>
           </a:p>
@@ -4497,7 +4497,7 @@
             <a:fld id="{BD246FCE-8122-C54A-9FAA-3BD1192FA1C2}" type="datetime1">
               <a:rPr lang="it-IT" altLang="it-IT"/>
               <a:pPr/>
-              <a:t>12/06/2019</a:t>
+              <a:t>22/06/2019</a:t>
             </a:fld>
             <a:endParaRPr lang="it-IT" altLang="it-IT"/>
           </a:p>
@@ -4811,7 +4811,7 @@
             <a:fld id="{89C8988E-3A3E-AA46-B902-CB4C32B9017D}" type="datetime1">
               <a:rPr lang="it-IT" altLang="it-IT"/>
               <a:pPr/>
-              <a:t>12/06/2019</a:t>
+              <a:t>22/06/2019</a:t>
             </a:fld>
             <a:endParaRPr lang="it-IT" altLang="it-IT"/>
           </a:p>
@@ -5265,7 +5265,7 @@
             <a:fld id="{E707E7C3-6E4C-D24B-B1E3-08759D1DD5E9}" type="datetime1">
               <a:rPr lang="it-IT" altLang="it-IT"/>
               <a:pPr/>
-              <a:t>12/06/2019</a:t>
+              <a:t>22/06/2019</a:t>
             </a:fld>
             <a:endParaRPr lang="it-IT" altLang="it-IT"/>
           </a:p>
@@ -8343,8 +8343,12 @@
           <a:lstStyle/>
           <a:p>
             <a:r>
+              <a:rPr lang="en-US" dirty="0" err="1"/>
+              <a:t>Allenando</a:t>
+            </a:r>
+            <a:r>
               <a:rPr lang="en-US" dirty="0"/>
-              <a:t>Training our Siamese Network</a:t>
+              <a:t> la rete Siamese</a:t>
             </a:r>
           </a:p>
         </p:txBody>
@@ -8372,7 +8376,23 @@
           <a:p>
             <a:r>
               <a:rPr lang="en-US" dirty="0"/>
-              <a:t>From dataset to training data and the training process</a:t>
+              <a:t>Dal dataset ai </a:t>
+            </a:r>
+            <a:r>
+              <a:rPr lang="en-US" dirty="0" err="1"/>
+              <a:t>dati</a:t>
+            </a:r>
+            <a:r>
+              <a:rPr lang="en-US" dirty="0"/>
+              <a:t> di training al </a:t>
+            </a:r>
+            <a:r>
+              <a:rPr lang="en-US" dirty="0" err="1"/>
+              <a:t>processo</a:t>
+            </a:r>
+            <a:r>
+              <a:rPr lang="en-US" dirty="0"/>
+              <a:t> di training</a:t>
             </a:r>
           </a:p>
         </p:txBody>
@@ -8401,7 +8421,7 @@
             <a:fld id="{11920B5F-69EE-AC48-9DF3-98215AFAB723}" type="datetime1">
               <a:rPr lang="it-IT" altLang="it-IT" smtClean="0"/>
               <a:pPr/>
-              <a:t>12/06/2019</a:t>
+              <a:t>22/06/2019</a:t>
             </a:fld>
             <a:endParaRPr lang="it-IT" altLang="it-IT"/>
           </a:p>
@@ -8479,13 +8499,13 @@
   <p:clrMapOvr>
     <a:masterClrMapping/>
   </p:clrMapOvr>
-  <mc:AlternateContent xmlns:mc="http://schemas.openxmlformats.org/markup-compatibility/2006">
-    <mc:Choice xmlns:p14="http://schemas.microsoft.com/office/powerpoint/2010/main" Requires="p14">
+  <mc:AlternateContent xmlns:mc="http://schemas.openxmlformats.org/markup-compatibility/2006" xmlns:p14="http://schemas.microsoft.com/office/powerpoint/2010/main">
+    <mc:Choice Requires="p14">
       <p:transition spd="slow" p14:dur="1250">
         <p14:switch dir="l"/>
       </p:transition>
     </mc:Choice>
-    <mc:Fallback>
+    <mc:Fallback xmlns="">
       <p:transition spd="slow">
         <p:fade/>
       </p:transition>
@@ -8534,7 +8554,7 @@
           <a:p>
             <a:r>
               <a:rPr lang="en-US" dirty="0"/>
-              <a:t>The CFPW Dataset</a:t>
+              <a:t>Il dataset CFPW </a:t>
             </a:r>
           </a:p>
         </p:txBody>
@@ -8556,7 +8576,7 @@
           </p:nvPr>
         </p:nvPicPr>
         <p:blipFill>
-          <a:blip r:embed="rId3"/>
+          <a:blip r:embed="rId2"/>
           <a:srcRect t="11187" b="11187"/>
           <a:stretch>
             <a:fillRect/>
@@ -8592,7 +8612,47 @@
           <a:p>
             <a:r>
               <a:rPr lang="en-US" dirty="0"/>
-              <a:t>A dataset of 500 celebrities; 14 photos of each, 10 from the front, 4 from the side. </a:t>
+              <a:t>Un dataset </a:t>
+            </a:r>
+            <a:r>
+              <a:rPr lang="en-US" dirty="0" err="1"/>
+              <a:t>contenente</a:t>
+            </a:r>
+            <a:r>
+              <a:rPr lang="en-US" dirty="0"/>
+              <a:t> 500 </a:t>
+            </a:r>
+            <a:r>
+              <a:rPr lang="en-US" dirty="0" err="1"/>
+              <a:t>celebirà</a:t>
+            </a:r>
+            <a:r>
+              <a:rPr lang="en-US" dirty="0"/>
+              <a:t>, con 14 </a:t>
+            </a:r>
+            <a:r>
+              <a:rPr lang="en-US" dirty="0" err="1"/>
+              <a:t>fotografie</a:t>
+            </a:r>
+            <a:r>
+              <a:rPr lang="en-US" dirty="0"/>
+              <a:t> per </a:t>
+            </a:r>
+            <a:r>
+              <a:rPr lang="en-US" dirty="0" err="1"/>
+              <a:t>ognuna</a:t>
+            </a:r>
+            <a:r>
+              <a:rPr lang="en-US" dirty="0"/>
+              <a:t>, 10 </a:t>
+            </a:r>
+            <a:r>
+              <a:rPr lang="en-US" dirty="0" err="1"/>
+              <a:t>frontali</a:t>
+            </a:r>
+            <a:r>
+              <a:rPr lang="en-US" dirty="0"/>
+              <a:t> e 4 di profilo. </a:t>
             </a:r>
           </a:p>
           <a:p>
@@ -8600,8 +8660,52 @@
           </a:p>
           <a:p>
             <a:r>
+              <a:rPr lang="en-US" dirty="0" err="1"/>
+              <a:t>Dimensioni</a:t>
+            </a:r>
+            <a:r>
               <a:rPr lang="en-US" dirty="0"/>
-              <a:t>Different sizes, different aspect ratios, different lighting and different expressions. </a:t>
+              <a:t>, </a:t>
+            </a:r>
+            <a:r>
+              <a:rPr lang="en-US" dirty="0" err="1"/>
+              <a:t>aspet</a:t>
+            </a:r>
+            <a:r>
+              <a:rPr lang="en-US" dirty="0"/>
+              <a:t> ratio, </a:t>
+            </a:r>
+            <a:r>
+              <a:rPr lang="en-US" dirty="0" err="1"/>
+              <a:t>condizioni</a:t>
+            </a:r>
+            <a:r>
+              <a:rPr lang="en-US" dirty="0"/>
+              <a:t> di luce ed </a:t>
+            </a:r>
+            <a:r>
+              <a:rPr lang="en-US" dirty="0" err="1"/>
+              <a:t>espressioni</a:t>
+            </a:r>
+            <a:r>
+              <a:rPr lang="en-US" dirty="0"/>
+              <a:t> </a:t>
+            </a:r>
+            <a:r>
+              <a:rPr lang="en-US" dirty="0" err="1"/>
+              <a:t>differenti</a:t>
+            </a:r>
+            <a:r>
+              <a:rPr lang="en-US" dirty="0"/>
+              <a:t> per </a:t>
+            </a:r>
+            <a:r>
+              <a:rPr lang="en-US" dirty="0" err="1"/>
+              <a:t>ogni</a:t>
+            </a:r>
+            <a:r>
+              <a:rPr lang="en-US" dirty="0"/>
+              <a:t> imagine. </a:t>
             </a:r>
           </a:p>
           <a:p>
@@ -8610,7 +8714,63 @@
           <a:p>
             <a:r>
               <a:rPr lang="en-US" dirty="0"/>
-              <a:t>For our purposes, we chose to only use the frontal facing images. </a:t>
+              <a:t>Per i nostri </a:t>
+            </a:r>
+            <a:r>
+              <a:rPr lang="en-US" dirty="0" err="1"/>
+              <a:t>scopi</a:t>
+            </a:r>
+            <a:r>
+              <a:rPr lang="en-US" dirty="0"/>
+              <a:t>, </a:t>
+            </a:r>
+            <a:r>
+              <a:rPr lang="en-US" dirty="0" err="1"/>
+              <a:t>abbiamo</a:t>
+            </a:r>
+            <a:r>
+              <a:rPr lang="en-US" dirty="0"/>
+              <a:t> </a:t>
+            </a:r>
+            <a:r>
+              <a:rPr lang="en-US" dirty="0" err="1"/>
+              <a:t>deciso</a:t>
+            </a:r>
+            <a:r>
+              <a:rPr lang="en-US" dirty="0"/>
+              <a:t> di </a:t>
+            </a:r>
+            <a:r>
+              <a:rPr lang="en-US" dirty="0" err="1"/>
+              <a:t>utilizzare</a:t>
+            </a:r>
+            <a:r>
+              <a:rPr lang="en-US" dirty="0"/>
+              <a:t> </a:t>
+            </a:r>
+            <a:r>
+              <a:rPr lang="en-US" dirty="0" err="1"/>
+              <a:t>soltanto</a:t>
+            </a:r>
+            <a:r>
+              <a:rPr lang="en-US" dirty="0"/>
+              <a:t> le </a:t>
+            </a:r>
+            <a:r>
+              <a:rPr lang="en-US" dirty="0" err="1"/>
+              <a:t>immagini</a:t>
+            </a:r>
+            <a:r>
+              <a:rPr lang="en-US" dirty="0"/>
+              <a:t> </a:t>
+            </a:r>
+            <a:r>
+              <a:rPr lang="en-US" dirty="0" err="1"/>
+              <a:t>frontali</a:t>
+            </a:r>
+            <a:r>
+              <a:rPr lang="en-US" dirty="0"/>
+              <a:t>. </a:t>
             </a:r>
           </a:p>
         </p:txBody>
@@ -8639,7 +8799,7 @@
             <a:fld id="{89C8988E-3A3E-AA46-B902-CB4C32B9017D}" type="datetime1">
               <a:rPr lang="it-IT" altLang="it-IT" smtClean="0"/>
               <a:pPr/>
-              <a:t>12/06/2019</a:t>
+              <a:t>22/06/2019</a:t>
             </a:fld>
             <a:endParaRPr lang="it-IT" altLang="it-IT"/>
           </a:p>
@@ -8722,7 +8882,7 @@
           <p:nvPr/>
         </p:nvPicPr>
         <p:blipFill>
-          <a:blip r:embed="rId4"/>
+          <a:blip r:embed="rId3"/>
           <a:stretch>
             <a:fillRect/>
           </a:stretch>
@@ -8752,7 +8912,7 @@
           <p:nvPr/>
         </p:nvPicPr>
         <p:blipFill>
-          <a:blip r:embed="rId5"/>
+          <a:blip r:embed="rId4"/>
           <a:stretch>
             <a:fillRect/>
           </a:stretch>
@@ -8782,7 +8942,7 @@
           <p:nvPr/>
         </p:nvPicPr>
         <p:blipFill>
-          <a:blip r:embed="rId6"/>
+          <a:blip r:embed="rId5"/>
           <a:stretch>
             <a:fillRect/>
           </a:stretch>
@@ -8812,7 +8972,7 @@
           <p:nvPr/>
         </p:nvPicPr>
         <p:blipFill>
-          <a:blip r:embed="rId7"/>
+          <a:blip r:embed="rId6"/>
           <a:stretch>
             <a:fillRect/>
           </a:stretch>
@@ -8842,7 +9002,7 @@
           <p:nvPr/>
         </p:nvPicPr>
         <p:blipFill>
-          <a:blip r:embed="rId8"/>
+          <a:blip r:embed="rId7"/>
           <a:stretch>
             <a:fillRect/>
           </a:stretch>
@@ -8872,7 +9032,7 @@
           <p:nvPr/>
         </p:nvPicPr>
         <p:blipFill>
-          <a:blip r:embed="rId9"/>
+          <a:blip r:embed="rId8"/>
           <a:stretch>
             <a:fillRect/>
           </a:stretch>
@@ -8902,7 +9062,7 @@
           <p:nvPr/>
         </p:nvPicPr>
         <p:blipFill>
-          <a:blip r:embed="rId10"/>
+          <a:blip r:embed="rId9"/>
           <a:stretch>
             <a:fillRect/>
           </a:stretch>
@@ -8932,7 +9092,7 @@
           <p:nvPr/>
         </p:nvPicPr>
         <p:blipFill>
-          <a:blip r:embed="rId11"/>
+          <a:blip r:embed="rId10"/>
           <a:stretch>
             <a:fillRect/>
           </a:stretch>
@@ -8962,7 +9122,7 @@
           <p:nvPr/>
         </p:nvPicPr>
         <p:blipFill>
-          <a:blip r:embed="rId12"/>
+          <a:blip r:embed="rId11"/>
           <a:stretch>
             <a:fillRect/>
           </a:stretch>
@@ -8992,7 +9152,7 @@
           <p:nvPr/>
         </p:nvPicPr>
         <p:blipFill>
-          <a:blip r:embed="rId13"/>
+          <a:blip r:embed="rId12"/>
           <a:stretch>
             <a:fillRect/>
           </a:stretch>
@@ -9022,7 +9182,7 @@
           <p:nvPr/>
         </p:nvPicPr>
         <p:blipFill>
-          <a:blip r:embed="rId14"/>
+          <a:blip r:embed="rId13"/>
           <a:stretch>
             <a:fillRect/>
           </a:stretch>
@@ -9052,7 +9212,7 @@
           <p:nvPr/>
         </p:nvPicPr>
         <p:blipFill>
-          <a:blip r:embed="rId15"/>
+          <a:blip r:embed="rId14"/>
           <a:stretch>
             <a:fillRect/>
           </a:stretch>
@@ -9082,7 +9242,7 @@
           <p:nvPr/>
         </p:nvPicPr>
         <p:blipFill>
-          <a:blip r:embed="rId16"/>
+          <a:blip r:embed="rId15"/>
           <a:stretch>
             <a:fillRect/>
           </a:stretch>
@@ -9112,10 +9272,10 @@
           <p:nvPr/>
         </p:nvPicPr>
         <p:blipFill>
-          <a:blip r:embed="rId17">
+          <a:blip r:embed="rId16">
             <a:extLst>
               <a:ext uri="{96DAC541-7B7A-43D3-8B79-37D633B846F1}">
-                <asvg:svgBlip xmlns:asvg="http://schemas.microsoft.com/office/drawing/2016/SVG/main" r:embed="rId18"/>
+                <asvg:svgBlip xmlns:asvg="http://schemas.microsoft.com/office/drawing/2016/SVG/main" r:embed="rId17"/>
               </a:ext>
             </a:extLst>
           </a:blip>
@@ -9148,10 +9308,10 @@
           <p:nvPr/>
         </p:nvPicPr>
         <p:blipFill>
-          <a:blip r:embed="rId19">
+          <a:blip r:embed="rId18">
             <a:extLst>
               <a:ext uri="{96DAC541-7B7A-43D3-8B79-37D633B846F1}">
-                <asvg:svgBlip xmlns:asvg="http://schemas.microsoft.com/office/drawing/2016/SVG/main" r:embed="rId20"/>
+                <asvg:svgBlip xmlns:asvg="http://schemas.microsoft.com/office/drawing/2016/SVG/main" r:embed="rId19"/>
               </a:ext>
             </a:extLst>
           </a:blip>
@@ -9184,10 +9344,10 @@
           <p:nvPr/>
         </p:nvPicPr>
         <p:blipFill>
-          <a:blip r:embed="rId19">
+          <a:blip r:embed="rId18">
             <a:extLst>
               <a:ext uri="{96DAC541-7B7A-43D3-8B79-37D633B846F1}">
-                <asvg:svgBlip xmlns:asvg="http://schemas.microsoft.com/office/drawing/2016/SVG/main" r:embed="rId20"/>
+                <asvg:svgBlip xmlns:asvg="http://schemas.microsoft.com/office/drawing/2016/SVG/main" r:embed="rId19"/>
               </a:ext>
             </a:extLst>
           </a:blip>
@@ -9220,10 +9380,10 @@
           <p:nvPr/>
         </p:nvPicPr>
         <p:blipFill>
-          <a:blip r:embed="rId17">
+          <a:blip r:embed="rId16">
             <a:extLst>
               <a:ext uri="{96DAC541-7B7A-43D3-8B79-37D633B846F1}">
-                <asvg:svgBlip xmlns:asvg="http://schemas.microsoft.com/office/drawing/2016/SVG/main" r:embed="rId18"/>
+                <asvg:svgBlip xmlns:asvg="http://schemas.microsoft.com/office/drawing/2016/SVG/main" r:embed="rId17"/>
               </a:ext>
             </a:extLst>
           </a:blip>
@@ -9251,13 +9411,13 @@
   <p:clrMapOvr>
     <a:masterClrMapping/>
   </p:clrMapOvr>
-  <mc:AlternateContent xmlns:mc="http://schemas.openxmlformats.org/markup-compatibility/2006">
-    <mc:Choice xmlns:p14="http://schemas.microsoft.com/office/powerpoint/2010/main" Requires="p14">
+  <mc:AlternateContent xmlns:mc="http://schemas.openxmlformats.org/markup-compatibility/2006" xmlns:p14="http://schemas.microsoft.com/office/powerpoint/2010/main">
+    <mc:Choice Requires="p14">
       <p:transition spd="slow" p14:dur="1250">
         <p14:switch dir="l"/>
       </p:transition>
     </mc:Choice>
-    <mc:Fallback>
+    <mc:Fallback xmlns="">
       <p:transition spd="slow">
         <p:fade/>
       </p:transition>
@@ -10447,8 +10607,12 @@
           <a:lstStyle/>
           <a:p>
             <a:r>
+              <a:rPr lang="en-US" dirty="0" err="1"/>
+              <a:t>Caricamento</a:t>
+            </a:r>
+            <a:r>
               <a:rPr lang="en-US" dirty="0"/>
-              <a:t>Loading and splitting</a:t>
+              <a:t> e splitting</a:t>
             </a:r>
           </a:p>
         </p:txBody>
@@ -10480,20 +10644,220 @@
           <a:lstStyle/>
           <a:p>
             <a:r>
-              <a:rPr lang="en-US" dirty="0"/>
-              <a:t>All 10 frontal images are loaded in RGB through PIL</a:t>
-            </a:r>
-          </a:p>
-          <a:p>
-            <a:r>
-              <a:rPr lang="en-US" dirty="0"/>
-              <a:t>Images are resized through the LANCZOS technique to 105x105</a:t>
-            </a:r>
-          </a:p>
-          <a:p>
-            <a:r>
-              <a:rPr lang="en-US" dirty="0"/>
-              <a:t>We randomly select 70% of the images of each celebrity for training, and use the remainder for testing</a:t>
+              <a:rPr lang="en-US" sz="2000" dirty="0" err="1"/>
+              <a:t>Tutte</a:t>
+            </a:r>
+            <a:r>
+              <a:rPr lang="en-US" sz="2000" dirty="0"/>
+              <a:t> e 10 le </a:t>
+            </a:r>
+            <a:r>
+              <a:rPr lang="en-US" sz="2000" dirty="0" err="1"/>
+              <a:t>immagini</a:t>
+            </a:r>
+            <a:r>
+              <a:rPr lang="en-US" sz="2000" dirty="0"/>
+              <a:t> </a:t>
+            </a:r>
+            <a:r>
+              <a:rPr lang="en-US" sz="2000" dirty="0" err="1"/>
+              <a:t>frontali</a:t>
+            </a:r>
+            <a:r>
+              <a:rPr lang="en-US" sz="2000" dirty="0"/>
+              <a:t> </a:t>
+            </a:r>
+            <a:r>
+              <a:rPr lang="en-US" sz="2000" dirty="0" err="1"/>
+              <a:t>vengono</a:t>
+            </a:r>
+            <a:r>
+              <a:rPr lang="en-US" sz="2000" dirty="0"/>
+              <a:t> </a:t>
+            </a:r>
+            <a:r>
+              <a:rPr lang="en-US" sz="2000" dirty="0" err="1"/>
+              <a:t>caricate</a:t>
+            </a:r>
+            <a:r>
+              <a:rPr lang="en-US" sz="2000" dirty="0"/>
+              <a:t> in </a:t>
+            </a:r>
+            <a:r>
+              <a:rPr lang="en-US" sz="2000" dirty="0" err="1"/>
+              <a:t>memoria</a:t>
+            </a:r>
+            <a:r>
+              <a:rPr lang="en-US" sz="2000" dirty="0"/>
+              <a:t> </a:t>
+            </a:r>
+            <a:r>
+              <a:rPr lang="en-US" sz="2000" dirty="0" err="1"/>
+              <a:t>attraverso</a:t>
+            </a:r>
+            <a:r>
+              <a:rPr lang="en-US" sz="2000" dirty="0"/>
+              <a:t> PIL</a:t>
+            </a:r>
+          </a:p>
+          <a:p>
+            <a:r>
+              <a:rPr lang="en-US" sz="2000" dirty="0"/>
+              <a:t>Le </a:t>
+            </a:r>
+            <a:r>
+              <a:rPr lang="en-US" sz="2000" dirty="0" err="1"/>
+              <a:t>immagini</a:t>
+            </a:r>
+            <a:r>
+              <a:rPr lang="en-US" sz="2000" dirty="0"/>
+              <a:t> </a:t>
+            </a:r>
+            <a:r>
+              <a:rPr lang="en-US" sz="2000" dirty="0" err="1"/>
+              <a:t>vengono</a:t>
+            </a:r>
+            <a:r>
+              <a:rPr lang="en-US" sz="2000" dirty="0"/>
+              <a:t> in </a:t>
+            </a:r>
+            <a:r>
+              <a:rPr lang="en-US" sz="2000" dirty="0" err="1"/>
+              <a:t>seguito</a:t>
+            </a:r>
+            <a:r>
+              <a:rPr lang="en-US" sz="2000" dirty="0"/>
+              <a:t> </a:t>
+            </a:r>
+            <a:r>
+              <a:rPr lang="en-US" sz="2000" dirty="0" err="1"/>
+              <a:t>ridimensionate</a:t>
+            </a:r>
+            <a:r>
+              <a:rPr lang="en-US" sz="2000" dirty="0"/>
+              <a:t> a 105x105 </a:t>
+            </a:r>
+            <a:r>
+              <a:rPr lang="en-US" sz="2000" dirty="0" err="1"/>
+              <a:t>attraverso</a:t>
+            </a:r>
+            <a:r>
+              <a:rPr lang="en-US" sz="2000" dirty="0"/>
+              <a:t> la </a:t>
+            </a:r>
+            <a:r>
+              <a:rPr lang="en-US" sz="2000" dirty="0" err="1"/>
+              <a:t>tecnica</a:t>
+            </a:r>
+            <a:r>
+              <a:rPr lang="en-US" sz="2000" dirty="0"/>
+              <a:t> LANCZOS</a:t>
+            </a:r>
+          </a:p>
+          <a:p>
+            <a:r>
+              <a:rPr lang="en-US" sz="2000" dirty="0" err="1"/>
+              <a:t>Vengono</a:t>
+            </a:r>
+            <a:r>
+              <a:rPr lang="en-US" sz="2000" dirty="0"/>
+              <a:t> </a:t>
+            </a:r>
+            <a:r>
+              <a:rPr lang="en-US" sz="2000" dirty="0" err="1"/>
+              <a:t>infine</a:t>
+            </a:r>
+            <a:r>
+              <a:rPr lang="en-US" sz="2000" dirty="0"/>
+              <a:t> </a:t>
+            </a:r>
+            <a:r>
+              <a:rPr lang="en-US" sz="2000" dirty="0" err="1"/>
+              <a:t>selezionate</a:t>
+            </a:r>
+            <a:r>
+              <a:rPr lang="en-US" sz="2000" dirty="0"/>
+              <a:t> </a:t>
+            </a:r>
+            <a:r>
+              <a:rPr lang="en-US" sz="2000" dirty="0" err="1"/>
+              <a:t>randomicamente</a:t>
+            </a:r>
+            <a:r>
+              <a:rPr lang="en-US" sz="2000" dirty="0"/>
+              <a:t> </a:t>
+            </a:r>
+            <a:r>
+              <a:rPr lang="en-US" sz="2000" dirty="0" err="1"/>
+              <a:t>il</a:t>
+            </a:r>
+            <a:r>
+              <a:rPr lang="en-US" sz="2000" dirty="0"/>
+              <a:t> 70% </a:t>
+            </a:r>
+            <a:r>
+              <a:rPr lang="en-US" sz="2000" dirty="0" err="1"/>
+              <a:t>delle</a:t>
+            </a:r>
+            <a:r>
+              <a:rPr lang="en-US" sz="2000" dirty="0"/>
+              <a:t> </a:t>
+            </a:r>
+            <a:r>
+              <a:rPr lang="en-US" sz="2000" dirty="0" err="1"/>
+              <a:t>immagini</a:t>
+            </a:r>
+            <a:r>
+              <a:rPr lang="en-US" sz="2000" dirty="0"/>
+              <a:t> di </a:t>
+            </a:r>
+            <a:r>
+              <a:rPr lang="en-US" sz="2000" dirty="0" err="1"/>
+              <a:t>ogni</a:t>
+            </a:r>
+            <a:r>
+              <a:rPr lang="en-US" sz="2000" dirty="0"/>
+              <a:t> persona per </a:t>
+            </a:r>
+            <a:r>
+              <a:rPr lang="en-US" sz="2000" dirty="0" err="1"/>
+              <a:t>il</a:t>
+            </a:r>
+            <a:r>
+              <a:rPr lang="en-US" sz="2000" dirty="0"/>
+              <a:t> training, e </a:t>
+            </a:r>
+            <a:r>
+              <a:rPr lang="en-US" sz="2000" dirty="0" err="1"/>
+              <a:t>viene</a:t>
+            </a:r>
+            <a:r>
+              <a:rPr lang="en-US" sz="2000" dirty="0"/>
+              <a:t> </a:t>
+            </a:r>
+            <a:r>
+              <a:rPr lang="en-US" sz="2000" dirty="0" err="1"/>
+              <a:t>lasciato</a:t>
+            </a:r>
+            <a:r>
+              <a:rPr lang="en-US" sz="2000" dirty="0"/>
+              <a:t> </a:t>
+            </a:r>
+            <a:r>
+              <a:rPr lang="en-US" sz="2000" dirty="0" err="1"/>
+              <a:t>il</a:t>
+            </a:r>
+            <a:r>
+              <a:rPr lang="en-US" sz="2000" dirty="0"/>
+              <a:t> restante per </a:t>
+            </a:r>
+            <a:r>
+              <a:rPr lang="en-US" sz="2000" dirty="0" err="1"/>
+              <a:t>il</a:t>
+            </a:r>
+            <a:r>
+              <a:rPr lang="en-US" sz="2000" dirty="0"/>
+              <a:t> testing</a:t>
             </a:r>
           </a:p>
         </p:txBody>
@@ -10522,7 +10886,7 @@
             <a:fld id="{FB8C070B-B5FF-3D45-AAB5-DF9925D634F2}" type="datetime1">
               <a:rPr lang="it-IT" altLang="it-IT" smtClean="0"/>
               <a:pPr/>
-              <a:t>12/06/2019</a:t>
+              <a:t>22/06/2019</a:t>
             </a:fld>
             <a:endParaRPr lang="it-IT" altLang="it-IT"/>
           </a:p>
@@ -10924,13 +11288,13 @@
   <p:clrMapOvr>
     <a:masterClrMapping/>
   </p:clrMapOvr>
-  <mc:AlternateContent xmlns:mc="http://schemas.openxmlformats.org/markup-compatibility/2006">
-    <mc:Choice xmlns:p14="http://schemas.microsoft.com/office/powerpoint/2010/main" Requires="p14">
+  <mc:AlternateContent xmlns:mc="http://schemas.openxmlformats.org/markup-compatibility/2006" xmlns:p14="http://schemas.microsoft.com/office/powerpoint/2010/main">
+    <mc:Choice Requires="p14">
       <p:transition spd="slow" p14:dur="1250">
         <p14:switch dir="l"/>
       </p:transition>
     </mc:Choice>
-    <mc:Fallback>
+    <mc:Fallback xmlns="">
       <p:transition spd="slow">
         <p:fade/>
       </p:transition>
@@ -11754,8 +12118,12 @@
           <a:lstStyle/>
           <a:p>
             <a:r>
+              <a:rPr lang="en-US" dirty="0" err="1"/>
+              <a:t>Allenamento</a:t>
+            </a:r>
+            <a:r>
               <a:rPr lang="en-US" dirty="0"/>
-              <a:t>Training through TensorFlow</a:t>
+              <a:t> con TensorFlow</a:t>
             </a:r>
           </a:p>
         </p:txBody>
@@ -11782,40 +12150,188 @@
           <a:lstStyle/>
           <a:p>
             <a:r>
+              <a:rPr lang="en-US" dirty="0" err="1"/>
+              <a:t>Tutte</a:t>
+            </a:r>
+            <a:r>
               <a:rPr lang="en-US" dirty="0"/>
-              <a:t>All images are converted to NumPy arrays of size 105x105x3 for TensorFlow support</a:t>
-            </a:r>
-          </a:p>
-          <a:p>
+              <a:t> le </a:t>
+            </a:r>
+            <a:r>
+              <a:rPr lang="en-US" dirty="0" err="1"/>
+              <a:t>immagini</a:t>
+            </a:r>
             <a:r>
               <a:rPr lang="en-US" dirty="0"/>
-              <a:t>At each iteration, the network takes a training batch of 32 pairs of images from the train set</a:t>
+              <a:t> </a:t>
+            </a:r>
+            <a:r>
+              <a:rPr lang="en-US" dirty="0" err="1"/>
+              <a:t>vengono</a:t>
+            </a:r>
+            <a:r>
+              <a:rPr lang="en-US" dirty="0"/>
+              <a:t> convertite in array NumPy di </a:t>
+            </a:r>
+            <a:r>
+              <a:rPr lang="en-US" dirty="0" err="1"/>
+              <a:t>dimensioni</a:t>
+            </a:r>
+            <a:r>
+              <a:rPr lang="en-US" dirty="0"/>
+              <a:t> 105x105x3 per </a:t>
+            </a:r>
+            <a:r>
+              <a:rPr lang="en-US" dirty="0" err="1"/>
+              <a:t>uso</a:t>
+            </a:r>
+            <a:r>
+              <a:rPr lang="en-US" dirty="0"/>
+              <a:t> </a:t>
+            </a:r>
+            <a:r>
+              <a:rPr lang="en-US" dirty="0" err="1"/>
+              <a:t>su</a:t>
+            </a:r>
+            <a:r>
+              <a:rPr lang="en-US" dirty="0"/>
+              <a:t> TensorFlow</a:t>
+            </a:r>
+          </a:p>
+          <a:p>
+            <a:r>
+              <a:rPr lang="en-US" dirty="0"/>
+              <a:t>Ad </a:t>
+            </a:r>
+            <a:r>
+              <a:rPr lang="en-US" dirty="0" err="1"/>
+              <a:t>ogni</a:t>
+            </a:r>
+            <a:r>
+              <a:rPr lang="en-US" dirty="0"/>
+              <a:t> </a:t>
+            </a:r>
+            <a:r>
+              <a:rPr lang="en-US" dirty="0" err="1"/>
+              <a:t>iterazione</a:t>
+            </a:r>
+            <a:r>
+              <a:rPr lang="en-US" dirty="0"/>
+              <a:t>, la rete </a:t>
+            </a:r>
+            <a:r>
+              <a:rPr lang="en-US" dirty="0" err="1"/>
+              <a:t>viene</a:t>
+            </a:r>
+            <a:r>
+              <a:rPr lang="en-US" dirty="0"/>
+              <a:t> </a:t>
+            </a:r>
+            <a:r>
+              <a:rPr lang="en-US" dirty="0" err="1"/>
+              <a:t>allenata</a:t>
+            </a:r>
+            <a:r>
+              <a:rPr lang="en-US" dirty="0"/>
+              <a:t> con una batch di 32 </a:t>
+            </a:r>
+            <a:r>
+              <a:rPr lang="en-US" dirty="0" err="1"/>
+              <a:t>coppie</a:t>
+            </a:r>
+            <a:r>
+              <a:rPr lang="en-US" dirty="0"/>
+              <a:t> di </a:t>
+            </a:r>
+            <a:r>
+              <a:rPr lang="en-US" dirty="0" err="1"/>
+              <a:t>immagini</a:t>
+            </a:r>
+            <a:r>
+              <a:rPr lang="en-US" dirty="0"/>
+              <a:t> prese a </a:t>
+            </a:r>
+            <a:r>
+              <a:rPr lang="en-US" dirty="0" err="1"/>
+              <a:t>caso</a:t>
+            </a:r>
+            <a:r>
+              <a:rPr lang="en-US" dirty="0"/>
+              <a:t> dal train set: </a:t>
             </a:r>
           </a:p>
           <a:p>
             <a:pPr lvl="1"/>
             <a:r>
               <a:rPr lang="en-US" dirty="0"/>
-              <a:t>16 “true” pairings</a:t>
+              <a:t>16 </a:t>
+            </a:r>
+            <a:r>
+              <a:rPr lang="en-US" dirty="0" err="1"/>
+              <a:t>coppie</a:t>
+            </a:r>
+            <a:r>
+              <a:rPr lang="en-US" dirty="0"/>
+              <a:t> “</a:t>
+            </a:r>
+            <a:r>
+              <a:rPr lang="en-US" dirty="0" err="1"/>
+              <a:t>vere</a:t>
+            </a:r>
+            <a:r>
+              <a:rPr lang="en-US" dirty="0"/>
+              <a:t>”</a:t>
             </a:r>
           </a:p>
           <a:p>
             <a:pPr lvl="1"/>
             <a:r>
               <a:rPr lang="en-US" dirty="0"/>
-              <a:t>16 “false” pairings</a:t>
-            </a:r>
-          </a:p>
-          <a:p>
+              <a:t>16 </a:t>
+            </a:r>
+            <a:r>
+              <a:rPr lang="en-US" dirty="0" err="1"/>
+              <a:t>coppie</a:t>
+            </a:r>
             <a:r>
               <a:rPr lang="en-US" dirty="0"/>
-              <a:t>Goal is to minimize loss </a:t>
+              <a:t> “false”</a:t>
+            </a:r>
+          </a:p>
+          <a:p>
+            <a:r>
+              <a:rPr lang="en-US" dirty="0"/>
+              <a:t>Lo </a:t>
+            </a:r>
+            <a:r>
+              <a:rPr lang="en-US" dirty="0" err="1"/>
+              <a:t>scopo</a:t>
+            </a:r>
+            <a:r>
+              <a:rPr lang="en-US" dirty="0"/>
+              <a:t> finale è </a:t>
+            </a:r>
+            <a:r>
+              <a:rPr lang="en-US" dirty="0" err="1"/>
+              <a:t>quello</a:t>
+            </a:r>
+            <a:r>
+              <a:rPr lang="en-US" dirty="0"/>
+              <a:t> di </a:t>
+            </a:r>
+            <a:r>
+              <a:rPr lang="en-US" dirty="0" err="1"/>
+              <a:t>minimizzare</a:t>
+            </a:r>
+            <a:r>
+              <a:rPr lang="en-US" dirty="0"/>
+              <a:t> la loss </a:t>
             </a:r>
             <a:r>
               <a:rPr lang="en-US" dirty="0">
                 <a:sym typeface="Wingdings" panose="05000000000000000000" pitchFamily="2" charset="2"/>
               </a:rPr>
-              <a:t> the Adam Optimizer</a:t>
+              <a:t> Adam Optimizer</a:t>
             </a:r>
             <a:endParaRPr lang="en-US" dirty="0"/>
           </a:p>
@@ -11845,7 +12361,7 @@
             <a:fld id="{5FE27D20-0B32-5D45-9A0B-0C7CC0271879}" type="datetime1">
               <a:rPr lang="it-IT" altLang="it-IT" smtClean="0"/>
               <a:pPr/>
-              <a:t>12/06/2019</a:t>
+              <a:t>22/06/2019</a:t>
             </a:fld>
             <a:endParaRPr lang="it-IT" altLang="it-IT"/>
           </a:p>
@@ -11923,13 +12439,13 @@
   <p:clrMapOvr>
     <a:masterClrMapping/>
   </p:clrMapOvr>
-  <mc:AlternateContent xmlns:mc="http://schemas.openxmlformats.org/markup-compatibility/2006">
-    <mc:Choice xmlns:p14="http://schemas.microsoft.com/office/powerpoint/2010/main" Requires="p14">
+  <mc:AlternateContent xmlns:mc="http://schemas.openxmlformats.org/markup-compatibility/2006" xmlns:p14="http://schemas.microsoft.com/office/powerpoint/2010/main">
+    <mc:Choice Requires="p14">
       <p:transition spd="slow" p14:dur="1250">
         <p14:switch dir="l"/>
       </p:transition>
     </mc:Choice>
-    <mc:Fallback>
+    <mc:Fallback xmlns="">
       <p:transition spd="slow">
         <p:fade/>
       </p:transition>
@@ -12526,7 +13042,15 @@
           <a:p>
             <a:r>
               <a:rPr lang="en-US" dirty="0"/>
-              <a:t>Accuracy testing while training</a:t>
+              <a:t>Test </a:t>
+            </a:r>
+            <a:r>
+              <a:rPr lang="en-US" dirty="0" err="1"/>
+              <a:t>dell’accuracy</a:t>
+            </a:r>
+            <a:r>
+              <a:rPr lang="en-US" dirty="0"/>
+              <a:t> in training</a:t>
             </a:r>
           </a:p>
         </p:txBody>
@@ -12553,35 +13077,141 @@
           <a:lstStyle/>
           <a:p>
             <a:r>
+              <a:rPr lang="en-US" sz="2800" dirty="0" err="1"/>
+              <a:t>Ogni</a:t>
+            </a:r>
+            <a:r>
               <a:rPr lang="en-US" sz="2800" dirty="0"/>
-              <a:t>Every 500 steps</a:t>
-            </a:r>
-          </a:p>
-          <a:p>
+              <a:t> 500 </a:t>
+            </a:r>
+            <a:r>
+              <a:rPr lang="en-US" sz="2800" dirty="0" err="1"/>
+              <a:t>passi</a:t>
+            </a:r>
+            <a:endParaRPr lang="en-US" sz="2800" dirty="0"/>
+          </a:p>
+          <a:p>
+            <a:r>
+              <a:rPr lang="en-US" sz="2800" dirty="0" err="1"/>
+              <a:t>Eseguito</a:t>
+            </a:r>
             <a:r>
               <a:rPr lang="en-US" sz="2800" dirty="0"/>
-              <a:t>Support set of 10 pairings from the test set</a:t>
+              <a:t> </a:t>
+            </a:r>
+            <a:r>
+              <a:rPr lang="en-US" sz="2800" dirty="0" err="1"/>
+              <a:t>su</a:t>
+            </a:r>
+            <a:r>
+              <a:rPr lang="en-US" sz="2800" dirty="0"/>
+              <a:t> un support set di 10 </a:t>
+            </a:r>
+            <a:r>
+              <a:rPr lang="en-US" sz="2800" dirty="0" err="1"/>
+              <a:t>coppie</a:t>
+            </a:r>
+            <a:r>
+              <a:rPr lang="en-US" sz="2800" dirty="0"/>
+              <a:t> prese dal test set: </a:t>
             </a:r>
           </a:p>
           <a:p>
             <a:pPr lvl="1"/>
             <a:r>
               <a:rPr lang="en-US" sz="2400" dirty="0"/>
-              <a:t>1 “true pairing”</a:t>
+              <a:t>1 </a:t>
+            </a:r>
+            <a:r>
+              <a:rPr lang="en-US" sz="2400" dirty="0" err="1"/>
+              <a:t>coppie</a:t>
+            </a:r>
+            <a:r>
+              <a:rPr lang="en-US" sz="2400" dirty="0"/>
+              <a:t> “</a:t>
+            </a:r>
+            <a:r>
+              <a:rPr lang="en-US" sz="2400" dirty="0" err="1"/>
+              <a:t>vera</a:t>
+            </a:r>
+            <a:r>
+              <a:rPr lang="en-US" sz="2400" dirty="0"/>
+              <a:t>”</a:t>
             </a:r>
           </a:p>
           <a:p>
             <a:pPr lvl="1"/>
             <a:r>
               <a:rPr lang="en-US" sz="2400" dirty="0"/>
-              <a:t>9 “false” pairings</a:t>
+              <a:t>9 </a:t>
+            </a:r>
+            <a:r>
+              <a:rPr lang="en-US" sz="2400" dirty="0" err="1"/>
+              <a:t>coppie</a:t>
+            </a:r>
+            <a:r>
+              <a:rPr lang="en-US" sz="2400" dirty="0"/>
+              <a:t> “false”</a:t>
             </a:r>
           </a:p>
           <a:p>
             <a:r>
               <a:rPr lang="en-US" sz="2800" dirty="0"/>
-              <a:t>Check if it guessed the “true” pairing as the most similar</a:t>
-            </a:r>
+              <a:t>Si </a:t>
+            </a:r>
+            <a:r>
+              <a:rPr lang="en-US" sz="2800" dirty="0" err="1"/>
+              <a:t>vede</a:t>
+            </a:r>
+            <a:r>
+              <a:rPr lang="en-US" sz="2800" dirty="0"/>
+              <a:t> se la </a:t>
+            </a:r>
+            <a:r>
+              <a:rPr lang="en-US" sz="2800" dirty="0" err="1"/>
+              <a:t>coppia</a:t>
+            </a:r>
+            <a:r>
+              <a:rPr lang="en-US" sz="2800" dirty="0"/>
+              <a:t> “</a:t>
+            </a:r>
+            <a:r>
+              <a:rPr lang="en-US" sz="2800" dirty="0" err="1"/>
+              <a:t>vera</a:t>
+            </a:r>
+            <a:r>
+              <a:rPr lang="en-US" sz="2800" dirty="0"/>
+              <a:t>” è </a:t>
+            </a:r>
+            <a:r>
+              <a:rPr lang="en-US" sz="2800" dirty="0" err="1"/>
+              <a:t>stata</a:t>
+            </a:r>
+            <a:r>
+              <a:rPr lang="en-US" sz="2800" dirty="0"/>
+              <a:t> </a:t>
+            </a:r>
+            <a:r>
+              <a:rPr lang="en-US" sz="2800" dirty="0" err="1"/>
+              <a:t>classificata</a:t>
+            </a:r>
+            <a:r>
+              <a:rPr lang="en-US" sz="2800" dirty="0"/>
+              <a:t> come la </a:t>
+            </a:r>
+            <a:r>
+              <a:rPr lang="en-US" sz="2800" dirty="0" err="1"/>
+              <a:t>più</a:t>
+            </a:r>
+            <a:r>
+              <a:rPr lang="en-US" sz="2800" dirty="0"/>
+              <a:t> simile o </a:t>
+            </a:r>
+            <a:r>
+              <a:rPr lang="en-US" sz="2800" dirty="0" err="1"/>
+              <a:t>meno</a:t>
+            </a:r>
+            <a:endParaRPr lang="en-US" sz="2800" dirty="0"/>
           </a:p>
         </p:txBody>
       </p:sp>
@@ -12609,7 +13239,7 @@
             <a:fld id="{5FE27D20-0B32-5D45-9A0B-0C7CC0271879}" type="datetime1">
               <a:rPr lang="it-IT" altLang="it-IT" smtClean="0"/>
               <a:pPr/>
-              <a:t>12/06/2019</a:t>
+              <a:t>22/06/2019</a:t>
             </a:fld>
             <a:endParaRPr lang="it-IT" altLang="it-IT"/>
           </a:p>
@@ -12687,13 +13317,13 @@
   <p:clrMapOvr>
     <a:masterClrMapping/>
   </p:clrMapOvr>
-  <mc:AlternateContent xmlns:mc="http://schemas.openxmlformats.org/markup-compatibility/2006">
-    <mc:Choice xmlns:p14="http://schemas.microsoft.com/office/powerpoint/2010/main" Requires="p14">
+  <mc:AlternateContent xmlns:mc="http://schemas.openxmlformats.org/markup-compatibility/2006" xmlns:p14="http://schemas.microsoft.com/office/powerpoint/2010/main">
+    <mc:Choice Requires="p14">
       <p:transition spd="slow" p14:dur="1250">
         <p14:switch dir="l"/>
       </p:transition>
     </mc:Choice>
-    <mc:Fallback>
+    <mc:Fallback xmlns="">
       <p:transition spd="slow">
         <p:fade/>
       </p:transition>
@@ -13290,8 +13920,21 @@
           <a:p>
             <a:r>
               <a:rPr lang="en-US" dirty="0"/>
-              <a:t>Our training results</a:t>
-            </a:r>
+              <a:t>I nostri </a:t>
+            </a:r>
+            <a:r>
+              <a:rPr lang="en-US" dirty="0" err="1"/>
+              <a:t>risultati</a:t>
+            </a:r>
+            <a:r>
+              <a:rPr lang="en-US" dirty="0"/>
+              <a:t> di </a:t>
+            </a:r>
+            <a:r>
+              <a:rPr lang="en-US" dirty="0" err="1"/>
+              <a:t>allenamento</a:t>
+            </a:r>
+            <a:endParaRPr lang="en-US" dirty="0"/>
           </a:p>
         </p:txBody>
       </p:sp>
@@ -13347,8 +13990,100 @@
           <a:lstStyle/>
           <a:p>
             <a:r>
+              <a:rPr lang="en-US" dirty="0" err="1"/>
+              <a:t>Dopo</a:t>
+            </a:r>
+            <a:r>
               <a:rPr lang="en-US" dirty="0"/>
-              <a:t>After a grand total of 60000 iterations over our network, loss had drastically decreased, and accuracy had settled around the 70% mark</a:t>
+              <a:t> un </a:t>
+            </a:r>
+            <a:r>
+              <a:rPr lang="en-US" dirty="0" err="1"/>
+              <a:t>totale</a:t>
+            </a:r>
+            <a:r>
+              <a:rPr lang="en-US" dirty="0"/>
+              <a:t> di 60000 </a:t>
+            </a:r>
+            <a:r>
+              <a:rPr lang="en-US" dirty="0" err="1"/>
+              <a:t>iterazioni</a:t>
+            </a:r>
+            <a:r>
+              <a:rPr lang="en-US" dirty="0"/>
+              <a:t>, la loss del </a:t>
+            </a:r>
+            <a:r>
+              <a:rPr lang="en-US" dirty="0" err="1"/>
+              <a:t>nostro</a:t>
+            </a:r>
+            <a:r>
+              <a:rPr lang="en-US" dirty="0"/>
+              <a:t> sistema è </a:t>
+            </a:r>
+            <a:r>
+              <a:rPr lang="en-US" dirty="0" err="1"/>
+              <a:t>decrementata</a:t>
+            </a:r>
+            <a:r>
+              <a:rPr lang="en-US" dirty="0"/>
+              <a:t> </a:t>
+            </a:r>
+            <a:r>
+              <a:rPr lang="en-US" dirty="0" err="1"/>
+              <a:t>drasticamente</a:t>
+            </a:r>
+            <a:r>
+              <a:rPr lang="en-US" dirty="0"/>
+              <a:t>, </a:t>
+            </a:r>
+            <a:r>
+              <a:rPr lang="en-US" dirty="0" err="1"/>
+              <a:t>mentre</a:t>
+            </a:r>
+            <a:r>
+              <a:rPr lang="en-US" dirty="0"/>
+              <a:t> </a:t>
+            </a:r>
+            <a:r>
+              <a:rPr lang="en-US" dirty="0" err="1"/>
+              <a:t>l’accuracy</a:t>
+            </a:r>
+            <a:r>
+              <a:rPr lang="en-US" dirty="0"/>
+              <a:t> </a:t>
+            </a:r>
+            <a:r>
+              <a:rPr lang="en-US" dirty="0" err="1"/>
+              <a:t>si</a:t>
+            </a:r>
+            <a:r>
+              <a:rPr lang="en-US" dirty="0"/>
+              <a:t> è </a:t>
+            </a:r>
+            <a:r>
+              <a:rPr lang="en-US" dirty="0" err="1"/>
+              <a:t>stabilizzata</a:t>
+            </a:r>
+            <a:r>
+              <a:rPr lang="en-US" dirty="0"/>
+              <a:t> </a:t>
+            </a:r>
+            <a:r>
+              <a:rPr lang="en-US" dirty="0" err="1"/>
+              <a:t>intorno</a:t>
+            </a:r>
+            <a:r>
+              <a:rPr lang="en-US" dirty="0"/>
+              <a:t> ad un </a:t>
+            </a:r>
+            <a:r>
+              <a:rPr lang="en-US" dirty="0" err="1"/>
+              <a:t>valore</a:t>
+            </a:r>
+            <a:r>
+              <a:rPr lang="en-US" dirty="0"/>
+              <a:t> di 70%</a:t>
             </a:r>
           </a:p>
         </p:txBody>
@@ -13377,7 +14112,7 @@
             <a:fld id="{89C8988E-3A3E-AA46-B902-CB4C32B9017D}" type="datetime1">
               <a:rPr lang="it-IT" altLang="it-IT" smtClean="0"/>
               <a:pPr/>
-              <a:t>12/06/2019</a:t>
+              <a:t>22/06/2019</a:t>
             </a:fld>
             <a:endParaRPr lang="it-IT" altLang="it-IT"/>
           </a:p>
@@ -13485,13 +14220,13 @@
   <p:clrMapOvr>
     <a:masterClrMapping/>
   </p:clrMapOvr>
-  <mc:AlternateContent xmlns:mc="http://schemas.openxmlformats.org/markup-compatibility/2006">
-    <mc:Choice xmlns:p14="http://schemas.microsoft.com/office/powerpoint/2010/main" Requires="p14">
+  <mc:AlternateContent xmlns:mc="http://schemas.openxmlformats.org/markup-compatibility/2006" xmlns:p14="http://schemas.microsoft.com/office/powerpoint/2010/main">
+    <mc:Choice Requires="p14">
       <p:transition spd="slow" p14:dur="1250">
         <p14:switch dir="l"/>
       </p:transition>
     </mc:Choice>
-    <mc:Fallback>
+    <mc:Fallback xmlns="">
       <p:transition spd="slow">
         <p:fade/>
       </p:transition>

</xml_diff>